<commit_message>
added grid layout and movement slide
</commit_message>
<xml_diff>
--- a/The Invisible Stalker.pptx
+++ b/The Invisible Stalker.pptx
@@ -8,10 +8,11 @@
     <p:sldId id="256" r:id="rId2"/>
     <p:sldId id="257" r:id="rId3"/>
     <p:sldId id="258" r:id="rId4"/>
-    <p:sldId id="259" r:id="rId5"/>
-    <p:sldId id="260" r:id="rId6"/>
-    <p:sldId id="261" r:id="rId7"/>
-    <p:sldId id="262" r:id="rId8"/>
+    <p:sldId id="263" r:id="rId5"/>
+    <p:sldId id="259" r:id="rId6"/>
+    <p:sldId id="260" r:id="rId7"/>
+    <p:sldId id="261" r:id="rId8"/>
+    <p:sldId id="262" r:id="rId9"/>
   </p:sldIdLst>
   <p:sldSz cx="12192000" cy="6858000"/>
   <p:notesSz cx="6858000" cy="9144000"/>
@@ -265,7 +266,7 @@
           <a:p>
             <a:fld id="{AB28FE0E-16AB-4CDC-A999-3E002218CACB}" type="datetimeFigureOut">
               <a:rPr lang="en-US" smtClean="0"/>
-              <a:t>12/16/2021</a:t>
+              <a:t>12/17/2021</a:t>
             </a:fld>
             <a:endParaRPr lang="en-US"/>
           </a:p>
@@ -463,7 +464,7 @@
           <a:p>
             <a:fld id="{AB28FE0E-16AB-4CDC-A999-3E002218CACB}" type="datetimeFigureOut">
               <a:rPr lang="en-US" smtClean="0"/>
-              <a:t>12/16/2021</a:t>
+              <a:t>12/17/2021</a:t>
             </a:fld>
             <a:endParaRPr lang="en-US"/>
           </a:p>
@@ -671,7 +672,7 @@
           <a:p>
             <a:fld id="{AB28FE0E-16AB-4CDC-A999-3E002218CACB}" type="datetimeFigureOut">
               <a:rPr lang="en-US" smtClean="0"/>
-              <a:t>12/16/2021</a:t>
+              <a:t>12/17/2021</a:t>
             </a:fld>
             <a:endParaRPr lang="en-US"/>
           </a:p>
@@ -869,7 +870,7 @@
           <a:p>
             <a:fld id="{AB28FE0E-16AB-4CDC-A999-3E002218CACB}" type="datetimeFigureOut">
               <a:rPr lang="en-US" smtClean="0"/>
-              <a:t>12/16/2021</a:t>
+              <a:t>12/17/2021</a:t>
             </a:fld>
             <a:endParaRPr lang="en-US"/>
           </a:p>
@@ -1144,7 +1145,7 @@
           <a:p>
             <a:fld id="{AB28FE0E-16AB-4CDC-A999-3E002218CACB}" type="datetimeFigureOut">
               <a:rPr lang="en-US" smtClean="0"/>
-              <a:t>12/16/2021</a:t>
+              <a:t>12/17/2021</a:t>
             </a:fld>
             <a:endParaRPr lang="en-US"/>
           </a:p>
@@ -1409,7 +1410,7 @@
           <a:p>
             <a:fld id="{AB28FE0E-16AB-4CDC-A999-3E002218CACB}" type="datetimeFigureOut">
               <a:rPr lang="en-US" smtClean="0"/>
-              <a:t>12/16/2021</a:t>
+              <a:t>12/17/2021</a:t>
             </a:fld>
             <a:endParaRPr lang="en-US"/>
           </a:p>
@@ -1821,7 +1822,7 @@
           <a:p>
             <a:fld id="{AB28FE0E-16AB-4CDC-A999-3E002218CACB}" type="datetimeFigureOut">
               <a:rPr lang="en-US" smtClean="0"/>
-              <a:t>12/16/2021</a:t>
+              <a:t>12/17/2021</a:t>
             </a:fld>
             <a:endParaRPr lang="en-US"/>
           </a:p>
@@ -1962,7 +1963,7 @@
           <a:p>
             <a:fld id="{AB28FE0E-16AB-4CDC-A999-3E002218CACB}" type="datetimeFigureOut">
               <a:rPr lang="en-US" smtClean="0"/>
-              <a:t>12/16/2021</a:t>
+              <a:t>12/17/2021</a:t>
             </a:fld>
             <a:endParaRPr lang="en-US"/>
           </a:p>
@@ -2075,7 +2076,7 @@
           <a:p>
             <a:fld id="{AB28FE0E-16AB-4CDC-A999-3E002218CACB}" type="datetimeFigureOut">
               <a:rPr lang="en-US" smtClean="0"/>
-              <a:t>12/16/2021</a:t>
+              <a:t>12/17/2021</a:t>
             </a:fld>
             <a:endParaRPr lang="en-US"/>
           </a:p>
@@ -2386,7 +2387,7 @@
           <a:p>
             <a:fld id="{AB28FE0E-16AB-4CDC-A999-3E002218CACB}" type="datetimeFigureOut">
               <a:rPr lang="en-US" smtClean="0"/>
-              <a:t>12/16/2021</a:t>
+              <a:t>12/17/2021</a:t>
             </a:fld>
             <a:endParaRPr lang="en-US"/>
           </a:p>
@@ -2674,7 +2675,7 @@
           <a:p>
             <a:fld id="{AB28FE0E-16AB-4CDC-A999-3E002218CACB}" type="datetimeFigureOut">
               <a:rPr lang="en-US" smtClean="0"/>
-              <a:t>12/16/2021</a:t>
+              <a:t>12/17/2021</a:t>
             </a:fld>
             <a:endParaRPr lang="en-US"/>
           </a:p>
@@ -2915,7 +2916,7 @@
           <a:p>
             <a:fld id="{AB28FE0E-16AB-4CDC-A999-3E002218CACB}" type="datetimeFigureOut">
               <a:rPr lang="en-US" smtClean="0"/>
-              <a:t>12/16/2021</a:t>
+              <a:t>12/17/2021</a:t>
             </a:fld>
             <a:endParaRPr lang="en-US"/>
           </a:p>
@@ -3630,7 +3631,7 @@
           <p:cNvPr id="2" name="Title 1">
             <a:extLst>
               <a:ext uri="{FF2B5EF4-FFF2-40B4-BE49-F238E27FC236}">
-                <a16:creationId xmlns:a16="http://schemas.microsoft.com/office/drawing/2014/main" id="{A30B917E-3C26-45F0-AC01-68BFB94B36F8}"/>
+                <a16:creationId xmlns:a16="http://schemas.microsoft.com/office/drawing/2014/main" id="{FFB0B78A-BCFB-424B-9727-4C5315227554}"/>
               </a:ext>
             </a:extLst>
           </p:cNvPr>
@@ -3649,98 +3650,38 @@
             <a:pPr algn="ctr"/>
             <a:r>
               <a:rPr lang="en-US" dirty="0"/>
-              <a:t>Easy</a:t>
-            </a:r>
-          </a:p>
-        </p:txBody>
-      </p:sp>
-      <p:sp>
-        <p:nvSpPr>
-          <p:cNvPr id="4" name="Content Placeholder 3">
-            <a:extLst>
-              <a:ext uri="{FF2B5EF4-FFF2-40B4-BE49-F238E27FC236}">
-                <a16:creationId xmlns:a16="http://schemas.microsoft.com/office/drawing/2014/main" id="{F66BC56D-83F9-4F6E-9E3E-7B54FB151519}"/>
-              </a:ext>
-            </a:extLst>
-          </p:cNvPr>
-          <p:cNvSpPr>
-            <a:spLocks noGrp="1"/>
-          </p:cNvSpPr>
-          <p:nvPr>
-            <p:ph sz="half" idx="1"/>
-          </p:nvPr>
-        </p:nvSpPr>
-        <p:spPr/>
-        <p:txBody>
-          <a:bodyPr/>
-          <a:lstStyle/>
-          <a:p>
+              <a:t>Grid Layout and Movement</a:t>
+            </a:r>
+          </a:p>
+        </p:txBody>
+      </p:sp>
+      <p:sp>
+        <p:nvSpPr>
+          <p:cNvPr id="3" name="Content Placeholder 2">
+            <a:extLst>
+              <a:ext uri="{FF2B5EF4-FFF2-40B4-BE49-F238E27FC236}">
+                <a16:creationId xmlns:a16="http://schemas.microsoft.com/office/drawing/2014/main" id="{F2A518E7-4A2B-4A0D-8D3E-9375545783C4}"/>
+              </a:ext>
+            </a:extLst>
+          </p:cNvPr>
+          <p:cNvSpPr>
+            <a:spLocks noGrp="1"/>
+          </p:cNvSpPr>
+          <p:nvPr>
+            <p:ph idx="1"/>
+          </p:nvPr>
+        </p:nvSpPr>
+        <p:spPr/>
+        <p:txBody>
+          <a:bodyPr/>
+          <a:lstStyle/>
+          <a:p>
+            <a:pPr marL="0" indent="0">
+              <a:buNone/>
+            </a:pPr>
             <a:r>
               <a:rPr lang="en-US" dirty="0"/>
-              <a:t>Grid Size: 4 x 4</a:t>
-            </a:r>
-          </a:p>
-          <a:p>
-            <a:r>
-              <a:rPr lang="en-US" dirty="0"/>
-              <a:t>Possibility of 2 floor materials</a:t>
-            </a:r>
-          </a:p>
-          <a:p>
-            <a:r>
-              <a:rPr lang="en-US" dirty="0"/>
-              <a:t>Win: Find stalker</a:t>
-            </a:r>
-          </a:p>
-          <a:p>
-            <a:r>
-              <a:rPr lang="en-US" dirty="0"/>
-              <a:t>Lose: run out of turns</a:t>
-            </a:r>
-          </a:p>
-        </p:txBody>
-      </p:sp>
-      <p:sp>
-        <p:nvSpPr>
-          <p:cNvPr id="5" name="Content Placeholder 4">
-            <a:extLst>
-              <a:ext uri="{FF2B5EF4-FFF2-40B4-BE49-F238E27FC236}">
-                <a16:creationId xmlns:a16="http://schemas.microsoft.com/office/drawing/2014/main" id="{406F47E4-763B-4CD8-9483-66879DF0CC35}"/>
-              </a:ext>
-            </a:extLst>
-          </p:cNvPr>
-          <p:cNvSpPr>
-            <a:spLocks noGrp="1"/>
-          </p:cNvSpPr>
-          <p:nvPr>
-            <p:ph sz="half" idx="2"/>
-          </p:nvPr>
-        </p:nvSpPr>
-        <p:spPr/>
-        <p:txBody>
-          <a:bodyPr/>
-          <a:lstStyle/>
-          <a:p>
-            <a:pPr marL="0" indent="0" algn="ctr">
-              <a:buNone/>
-            </a:pPr>
-            <a:r>
-              <a:rPr lang="en-US" b="1" u="sng" dirty="0"/>
-              <a:t>Characters</a:t>
-            </a:r>
-          </a:p>
-          <a:p>
-            <a:pPr algn="ctr"/>
-            <a:r>
-              <a:rPr lang="en-US" dirty="0"/>
-              <a:t>Player</a:t>
-            </a:r>
-          </a:p>
-          <a:p>
-            <a:pPr algn="ctr"/>
-            <a:r>
-              <a:rPr lang="en-US" dirty="0"/>
-              <a:t>Stalker</a:t>
+              <a:t>The grid will consist of one of three options depending on difficulty:4x4, 6x6, or 8x8. Each square will be made of one of the following materials: grass, wood, or stone. Materials will be placed in “clusters” that will contain 2-4 squares. Navigating the grid will require A,S,D,W or the LEFT, RIGHT, UP, and DOWN arrows. A, LEFT, D, and RIGHT will be used to turn left or right and will not count toward your movement. W and UP will be used for moving forward. S and DOWN will be used for moving backward. You can move two squares on a turn.</a:t>
             </a:r>
           </a:p>
         </p:txBody>
@@ -3748,7 +3689,7 @@
     </p:spTree>
     <p:extLst>
       <p:ext uri="{BB962C8B-B14F-4D97-AF65-F5344CB8AC3E}">
-        <p14:creationId xmlns:p14="http://schemas.microsoft.com/office/powerpoint/2010/main" val="362566508"/>
+        <p14:creationId xmlns:p14="http://schemas.microsoft.com/office/powerpoint/2010/main" val="3930859471"/>
       </p:ext>
     </p:extLst>
   </p:cSld>
@@ -3780,7 +3721,7 @@
           <p:cNvPr id="2" name="Title 1">
             <a:extLst>
               <a:ext uri="{FF2B5EF4-FFF2-40B4-BE49-F238E27FC236}">
-                <a16:creationId xmlns:a16="http://schemas.microsoft.com/office/drawing/2014/main" id="{B500AB53-5E3F-4365-95F8-1AFEFA1EF27D}"/>
+                <a16:creationId xmlns:a16="http://schemas.microsoft.com/office/drawing/2014/main" id="{A30B917E-3C26-45F0-AC01-68BFB94B36F8}"/>
               </a:ext>
             </a:extLst>
           </p:cNvPr>
@@ -3799,7 +3740,7 @@
             <a:pPr algn="ctr"/>
             <a:r>
               <a:rPr lang="en-US" dirty="0"/>
-              <a:t>Normal</a:t>
+              <a:t>Easy</a:t>
             </a:r>
           </a:p>
         </p:txBody>
@@ -3809,7 +3750,7 @@
           <p:cNvPr id="4" name="Content Placeholder 3">
             <a:extLst>
               <a:ext uri="{FF2B5EF4-FFF2-40B4-BE49-F238E27FC236}">
-                <a16:creationId xmlns:a16="http://schemas.microsoft.com/office/drawing/2014/main" id="{B2F77BC6-AB1C-42CF-91F7-2D97F1FFC909}"/>
+                <a16:creationId xmlns:a16="http://schemas.microsoft.com/office/drawing/2014/main" id="{F66BC56D-83F9-4F6E-9E3E-7B54FB151519}"/>
               </a:ext>
             </a:extLst>
           </p:cNvPr>
@@ -3827,25 +3768,25 @@
           <a:p>
             <a:r>
               <a:rPr lang="en-US" dirty="0"/>
-              <a:t>Grid size: 6 x 6</a:t>
+              <a:t>Grid Size: 4 x 4</a:t>
             </a:r>
           </a:p>
           <a:p>
             <a:r>
               <a:rPr lang="en-US" dirty="0"/>
-              <a:t>Possibility of 3 floor materials</a:t>
+              <a:t>Possibility of 2 floor materials</a:t>
             </a:r>
           </a:p>
           <a:p>
             <a:r>
               <a:rPr lang="en-US" dirty="0"/>
-              <a:t>Win: find sword, then stalker</a:t>
+              <a:t>Win: Find stalker</a:t>
             </a:r>
           </a:p>
           <a:p>
             <a:r>
               <a:rPr lang="en-US" dirty="0"/>
-              <a:t>Lose: find stalker without sword or run out of turns</a:t>
+              <a:t>Lose: run out of turns</a:t>
             </a:r>
           </a:p>
         </p:txBody>
@@ -3855,7 +3796,7 @@
           <p:cNvPr id="5" name="Content Placeholder 4">
             <a:extLst>
               <a:ext uri="{FF2B5EF4-FFF2-40B4-BE49-F238E27FC236}">
-                <a16:creationId xmlns:a16="http://schemas.microsoft.com/office/drawing/2014/main" id="{EAC0854D-B244-45C2-868B-45720CA75B31}"/>
+                <a16:creationId xmlns:a16="http://schemas.microsoft.com/office/drawing/2014/main" id="{406F47E4-763B-4CD8-9483-66879DF0CC35}"/>
               </a:ext>
             </a:extLst>
           </p:cNvPr>
@@ -3876,7 +3817,7 @@
             </a:pPr>
             <a:r>
               <a:rPr lang="en-US" b="1" u="sng" dirty="0"/>
-              <a:t>Characters/Objects</a:t>
+              <a:t>Characters</a:t>
             </a:r>
           </a:p>
           <a:p>
@@ -3891,13 +3832,6 @@
             <a:r>
               <a:rPr lang="en-US" dirty="0"/>
               <a:t>Stalker</a:t>
-            </a:r>
-          </a:p>
-          <a:p>
-            <a:pPr algn="ctr"/>
-            <a:r>
-              <a:rPr lang="en-US" dirty="0"/>
-              <a:t>Sword</a:t>
             </a:r>
           </a:p>
         </p:txBody>
@@ -3905,7 +3839,7 @@
     </p:spTree>
     <p:extLst>
       <p:ext uri="{BB962C8B-B14F-4D97-AF65-F5344CB8AC3E}">
-        <p14:creationId xmlns:p14="http://schemas.microsoft.com/office/powerpoint/2010/main" val="3271518336"/>
+        <p14:creationId xmlns:p14="http://schemas.microsoft.com/office/powerpoint/2010/main" val="362566508"/>
       </p:ext>
     </p:extLst>
   </p:cSld>
@@ -3956,6 +3890,163 @@
             <a:pPr algn="ctr"/>
             <a:r>
               <a:rPr lang="en-US" dirty="0"/>
+              <a:t>Normal</a:t>
+            </a:r>
+          </a:p>
+        </p:txBody>
+      </p:sp>
+      <p:sp>
+        <p:nvSpPr>
+          <p:cNvPr id="4" name="Content Placeholder 3">
+            <a:extLst>
+              <a:ext uri="{FF2B5EF4-FFF2-40B4-BE49-F238E27FC236}">
+                <a16:creationId xmlns:a16="http://schemas.microsoft.com/office/drawing/2014/main" id="{B2F77BC6-AB1C-42CF-91F7-2D97F1FFC909}"/>
+              </a:ext>
+            </a:extLst>
+          </p:cNvPr>
+          <p:cNvSpPr>
+            <a:spLocks noGrp="1"/>
+          </p:cNvSpPr>
+          <p:nvPr>
+            <p:ph sz="half" idx="1"/>
+          </p:nvPr>
+        </p:nvSpPr>
+        <p:spPr/>
+        <p:txBody>
+          <a:bodyPr/>
+          <a:lstStyle/>
+          <a:p>
+            <a:r>
+              <a:rPr lang="en-US" dirty="0"/>
+              <a:t>Grid size: 6 x 6</a:t>
+            </a:r>
+          </a:p>
+          <a:p>
+            <a:r>
+              <a:rPr lang="en-US" dirty="0"/>
+              <a:t>Possibility of 3 floor materials</a:t>
+            </a:r>
+          </a:p>
+          <a:p>
+            <a:r>
+              <a:rPr lang="en-US" dirty="0"/>
+              <a:t>Win: find sword, then stalker</a:t>
+            </a:r>
+          </a:p>
+          <a:p>
+            <a:r>
+              <a:rPr lang="en-US" dirty="0"/>
+              <a:t>Lose: find stalker without sword or run out of turns</a:t>
+            </a:r>
+          </a:p>
+        </p:txBody>
+      </p:sp>
+      <p:sp>
+        <p:nvSpPr>
+          <p:cNvPr id="5" name="Content Placeholder 4">
+            <a:extLst>
+              <a:ext uri="{FF2B5EF4-FFF2-40B4-BE49-F238E27FC236}">
+                <a16:creationId xmlns:a16="http://schemas.microsoft.com/office/drawing/2014/main" id="{EAC0854D-B244-45C2-868B-45720CA75B31}"/>
+              </a:ext>
+            </a:extLst>
+          </p:cNvPr>
+          <p:cNvSpPr>
+            <a:spLocks noGrp="1"/>
+          </p:cNvSpPr>
+          <p:nvPr>
+            <p:ph sz="half" idx="2"/>
+          </p:nvPr>
+        </p:nvSpPr>
+        <p:spPr/>
+        <p:txBody>
+          <a:bodyPr/>
+          <a:lstStyle/>
+          <a:p>
+            <a:pPr marL="0" indent="0" algn="ctr">
+              <a:buNone/>
+            </a:pPr>
+            <a:r>
+              <a:rPr lang="en-US" b="1" u="sng" dirty="0"/>
+              <a:t>Characters/Objects</a:t>
+            </a:r>
+          </a:p>
+          <a:p>
+            <a:pPr algn="ctr"/>
+            <a:r>
+              <a:rPr lang="en-US" dirty="0"/>
+              <a:t>Player</a:t>
+            </a:r>
+          </a:p>
+          <a:p>
+            <a:pPr algn="ctr"/>
+            <a:r>
+              <a:rPr lang="en-US" dirty="0"/>
+              <a:t>Stalker</a:t>
+            </a:r>
+          </a:p>
+          <a:p>
+            <a:pPr algn="ctr"/>
+            <a:r>
+              <a:rPr lang="en-US" dirty="0"/>
+              <a:t>Sword</a:t>
+            </a:r>
+          </a:p>
+        </p:txBody>
+      </p:sp>
+    </p:spTree>
+    <p:extLst>
+      <p:ext uri="{BB962C8B-B14F-4D97-AF65-F5344CB8AC3E}">
+        <p14:creationId xmlns:p14="http://schemas.microsoft.com/office/powerpoint/2010/main" val="3271518336"/>
+      </p:ext>
+    </p:extLst>
+  </p:cSld>
+  <p:clrMapOvr>
+    <a:masterClrMapping/>
+  </p:clrMapOvr>
+</p:sld>
+</file>
+
+<file path=ppt/slides/slide7.xml><?xml version="1.0" encoding="utf-8"?>
+<p:sld xmlns:a="http://schemas.openxmlformats.org/drawingml/2006/main" xmlns:r="http://schemas.openxmlformats.org/officeDocument/2006/relationships" xmlns:p="http://schemas.openxmlformats.org/presentationml/2006/main">
+  <p:cSld>
+    <p:spTree>
+      <p:nvGrpSpPr>
+        <p:cNvPr id="1" name=""/>
+        <p:cNvGrpSpPr/>
+        <p:nvPr/>
+      </p:nvGrpSpPr>
+      <p:grpSpPr>
+        <a:xfrm>
+          <a:off x="0" y="0"/>
+          <a:ext cx="0" cy="0"/>
+          <a:chOff x="0" y="0"/>
+          <a:chExt cx="0" cy="0"/>
+        </a:xfrm>
+      </p:grpSpPr>
+      <p:sp>
+        <p:nvSpPr>
+          <p:cNvPr id="2" name="Title 1">
+            <a:extLst>
+              <a:ext uri="{FF2B5EF4-FFF2-40B4-BE49-F238E27FC236}">
+                <a16:creationId xmlns:a16="http://schemas.microsoft.com/office/drawing/2014/main" id="{B500AB53-5E3F-4365-95F8-1AFEFA1EF27D}"/>
+              </a:ext>
+            </a:extLst>
+          </p:cNvPr>
+          <p:cNvSpPr>
+            <a:spLocks noGrp="1"/>
+          </p:cNvSpPr>
+          <p:nvPr>
+            <p:ph type="title"/>
+          </p:nvPr>
+        </p:nvSpPr>
+        <p:spPr/>
+        <p:txBody>
+          <a:bodyPr/>
+          <a:lstStyle/>
+          <a:p>
+            <a:pPr algn="ctr"/>
+            <a:r>
+              <a:rPr lang="en-US" dirty="0"/>
               <a:t>Hard</a:t>
             </a:r>
           </a:p>
@@ -4086,7 +4177,7 @@
 </p:sld>
 </file>
 
-<file path=ppt/slides/slide7.xml><?xml version="1.0" encoding="utf-8"?>
+<file path=ppt/slides/slide8.xml><?xml version="1.0" encoding="utf-8"?>
 <p:sld xmlns:a="http://schemas.openxmlformats.org/drawingml/2006/main" xmlns:r="http://schemas.openxmlformats.org/officeDocument/2006/relationships" xmlns:p="http://schemas.openxmlformats.org/presentationml/2006/main">
   <p:cSld>
     <p:spTree>

</xml_diff>